<commit_message>
add crc8 verification code
</commit_message>
<xml_diff>
--- a/AE Cloud2 Arduino Firmware with SHT 31 (Grove Port).pptx
+++ b/AE Cloud2 Arduino Firmware with SHT 31 (Grove Port).pptx
@@ -9,8 +9,9 @@
     <p:sldId id="258" r:id="rId3"/>
     <p:sldId id="266" r:id="rId4"/>
     <p:sldId id="257" r:id="rId5"/>
-    <p:sldId id="267" r:id="rId6"/>
-    <p:sldId id="265" r:id="rId7"/>
+    <p:sldId id="268" r:id="rId6"/>
+    <p:sldId id="267" r:id="rId7"/>
+    <p:sldId id="265" r:id="rId8"/>
   </p:sldIdLst>
   <p:sldSz cx="12192000" cy="6858000"/>
   <p:notesSz cx="6858000" cy="9144000"/>
@@ -109,6 +110,11 @@
       </a:defRPr>
     </a:lvl9pPr>
   </p:defaultTextStyle>
+  <p:extLst>
+    <p:ext uri="{EFAFB233-063F-42B5-8137-9DF3F51BA10A}">
+      <p15:sldGuideLst xmlns:p15="http://schemas.microsoft.com/office/powerpoint/2012/main"/>
+    </p:ext>
+  </p:extLst>
 </p:presentation>
 </file>
 
@@ -259,7 +265,7 @@
           <a:p>
             <a:fld id="{0ED70EB4-293D-4864-8AA8-48ADEA0EC237}" type="datetimeFigureOut">
               <a:rPr lang="en-US" smtClean="0"/>
-              <a:t>4/1/2019</a:t>
+              <a:t>4/9/2019</a:t>
             </a:fld>
             <a:endParaRPr lang="en-US"/>
           </a:p>
@@ -457,7 +463,7 @@
           <a:p>
             <a:fld id="{0ED70EB4-293D-4864-8AA8-48ADEA0EC237}" type="datetimeFigureOut">
               <a:rPr lang="en-US" smtClean="0"/>
-              <a:t>4/1/2019</a:t>
+              <a:t>4/9/2019</a:t>
             </a:fld>
             <a:endParaRPr lang="en-US"/>
           </a:p>
@@ -665,7 +671,7 @@
           <a:p>
             <a:fld id="{0ED70EB4-293D-4864-8AA8-48ADEA0EC237}" type="datetimeFigureOut">
               <a:rPr lang="en-US" smtClean="0"/>
-              <a:t>4/1/2019</a:t>
+              <a:t>4/9/2019</a:t>
             </a:fld>
             <a:endParaRPr lang="en-US"/>
           </a:p>
@@ -863,7 +869,7 @@
           <a:p>
             <a:fld id="{0ED70EB4-293D-4864-8AA8-48ADEA0EC237}" type="datetimeFigureOut">
               <a:rPr lang="en-US" smtClean="0"/>
-              <a:t>4/1/2019</a:t>
+              <a:t>4/9/2019</a:t>
             </a:fld>
             <a:endParaRPr lang="en-US"/>
           </a:p>
@@ -1138,7 +1144,7 @@
           <a:p>
             <a:fld id="{0ED70EB4-293D-4864-8AA8-48ADEA0EC237}" type="datetimeFigureOut">
               <a:rPr lang="en-US" smtClean="0"/>
-              <a:t>4/1/2019</a:t>
+              <a:t>4/9/2019</a:t>
             </a:fld>
             <a:endParaRPr lang="en-US"/>
           </a:p>
@@ -1403,7 +1409,7 @@
           <a:p>
             <a:fld id="{0ED70EB4-293D-4864-8AA8-48ADEA0EC237}" type="datetimeFigureOut">
               <a:rPr lang="en-US" smtClean="0"/>
-              <a:t>4/1/2019</a:t>
+              <a:t>4/9/2019</a:t>
             </a:fld>
             <a:endParaRPr lang="en-US"/>
           </a:p>
@@ -1815,7 +1821,7 @@
           <a:p>
             <a:fld id="{0ED70EB4-293D-4864-8AA8-48ADEA0EC237}" type="datetimeFigureOut">
               <a:rPr lang="en-US" smtClean="0"/>
-              <a:t>4/1/2019</a:t>
+              <a:t>4/9/2019</a:t>
             </a:fld>
             <a:endParaRPr lang="en-US"/>
           </a:p>
@@ -1956,7 +1962,7 @@
           <a:p>
             <a:fld id="{0ED70EB4-293D-4864-8AA8-48ADEA0EC237}" type="datetimeFigureOut">
               <a:rPr lang="en-US" smtClean="0"/>
-              <a:t>4/1/2019</a:t>
+              <a:t>4/9/2019</a:t>
             </a:fld>
             <a:endParaRPr lang="en-US"/>
           </a:p>
@@ -2069,7 +2075,7 @@
           <a:p>
             <a:fld id="{0ED70EB4-293D-4864-8AA8-48ADEA0EC237}" type="datetimeFigureOut">
               <a:rPr lang="en-US" smtClean="0"/>
-              <a:t>4/1/2019</a:t>
+              <a:t>4/9/2019</a:t>
             </a:fld>
             <a:endParaRPr lang="en-US"/>
           </a:p>
@@ -2380,7 +2386,7 @@
           <a:p>
             <a:fld id="{0ED70EB4-293D-4864-8AA8-48ADEA0EC237}" type="datetimeFigureOut">
               <a:rPr lang="en-US" smtClean="0"/>
-              <a:t>4/1/2019</a:t>
+              <a:t>4/9/2019</a:t>
             </a:fld>
             <a:endParaRPr lang="en-US"/>
           </a:p>
@@ -2668,7 +2674,7 @@
           <a:p>
             <a:fld id="{0ED70EB4-293D-4864-8AA8-48ADEA0EC237}" type="datetimeFigureOut">
               <a:rPr lang="en-US" smtClean="0"/>
-              <a:t>4/1/2019</a:t>
+              <a:t>4/9/2019</a:t>
             </a:fld>
             <a:endParaRPr lang="en-US"/>
           </a:p>
@@ -2909,7 +2915,7 @@
           <a:p>
             <a:fld id="{0ED70EB4-293D-4864-8AA8-48ADEA0EC237}" type="datetimeFigureOut">
               <a:rPr lang="en-US" smtClean="0"/>
-              <a:t>4/1/2019</a:t>
+              <a:t>4/9/2019</a:t>
             </a:fld>
             <a:endParaRPr lang="en-US"/>
           </a:p>
@@ -3809,6 +3815,125 @@
           <p:cNvPr id="2" name="Title 1">
             <a:extLst>
               <a:ext uri="{FF2B5EF4-FFF2-40B4-BE49-F238E27FC236}">
+                <a16:creationId xmlns:a16="http://schemas.microsoft.com/office/drawing/2014/main" id="{E574741C-DFEA-41E2-994C-8A437DC62189}"/>
+              </a:ext>
+            </a:extLst>
+          </p:cNvPr>
+          <p:cNvSpPr>
+            <a:spLocks noGrp="1"/>
+          </p:cNvSpPr>
+          <p:nvPr>
+            <p:ph type="title"/>
+          </p:nvPr>
+        </p:nvSpPr>
+        <p:spPr/>
+        <p:txBody>
+          <a:bodyPr/>
+          <a:lstStyle/>
+          <a:p>
+            <a:pPr algn="ctr"/>
+            <a:r>
+              <a:rPr lang="en-US" dirty="0"/>
+              <a:t>Added CRC8 Verification for Temperature and Humidity Data to SHT31.cpp</a:t>
+            </a:r>
+          </a:p>
+        </p:txBody>
+      </p:sp>
+      <p:pic>
+        <p:nvPicPr>
+          <p:cNvPr id="4" name="Content Placeholder 3">
+            <a:extLst>
+              <a:ext uri="{FF2B5EF4-FFF2-40B4-BE49-F238E27FC236}">
+                <a16:creationId xmlns:a16="http://schemas.microsoft.com/office/drawing/2014/main" id="{E1048C2D-1A8B-4FF7-BEB8-E42BF77E78E1}"/>
+              </a:ext>
+            </a:extLst>
+          </p:cNvPr>
+          <p:cNvPicPr>
+            <a:picLocks noGrp="1" noChangeAspect="1"/>
+          </p:cNvPicPr>
+          <p:nvPr>
+            <p:ph idx="1"/>
+          </p:nvPr>
+        </p:nvPicPr>
+        <p:blipFill rotWithShape="1">
+          <a:blip r:embed="rId2"/>
+          <a:srcRect l="9873" t="25696" r="53629" b="16239"/>
+          <a:stretch/>
+        </p:blipFill>
+        <p:spPr>
+          <a:xfrm>
+            <a:off x="737937" y="2165683"/>
+            <a:ext cx="4302339" cy="3850106"/>
+          </a:xfrm>
+          <a:prstGeom prst="rect">
+            <a:avLst/>
+          </a:prstGeom>
+        </p:spPr>
+      </p:pic>
+      <p:pic>
+        <p:nvPicPr>
+          <p:cNvPr id="5" name="Picture 4">
+            <a:extLst>
+              <a:ext uri="{FF2B5EF4-FFF2-40B4-BE49-F238E27FC236}">
+                <a16:creationId xmlns:a16="http://schemas.microsoft.com/office/drawing/2014/main" id="{E1D7C209-DA27-4914-A804-0A0837F0A304}"/>
+              </a:ext>
+            </a:extLst>
+          </p:cNvPr>
+          <p:cNvPicPr>
+            <a:picLocks noChangeAspect="1"/>
+          </p:cNvPicPr>
+          <p:nvPr/>
+        </p:nvPicPr>
+        <p:blipFill rotWithShape="1">
+          <a:blip r:embed="rId3"/>
+          <a:srcRect l="50131" t="13099" r="8553" b="4326"/>
+          <a:stretch/>
+        </p:blipFill>
+        <p:spPr>
+          <a:xfrm>
+            <a:off x="6232358" y="1884948"/>
+            <a:ext cx="4272229" cy="4802858"/>
+          </a:xfrm>
+          <a:prstGeom prst="rect">
+            <a:avLst/>
+          </a:prstGeom>
+        </p:spPr>
+      </p:pic>
+    </p:spTree>
+    <p:extLst>
+      <p:ext uri="{BB962C8B-B14F-4D97-AF65-F5344CB8AC3E}">
+        <p14:creationId xmlns:p14="http://schemas.microsoft.com/office/powerpoint/2010/main" val="2274976986"/>
+      </p:ext>
+    </p:extLst>
+  </p:cSld>
+  <p:clrMapOvr>
+    <a:masterClrMapping/>
+  </p:clrMapOvr>
+</p:sld>
+</file>
+
+<file path=ppt/slides/slide6.xml><?xml version="1.0" encoding="utf-8"?>
+<p:sld xmlns:a="http://schemas.openxmlformats.org/drawingml/2006/main" xmlns:r="http://schemas.openxmlformats.org/officeDocument/2006/relationships" xmlns:p="http://schemas.openxmlformats.org/presentationml/2006/main">
+  <p:cSld>
+    <p:spTree>
+      <p:nvGrpSpPr>
+        <p:cNvPr id="1" name=""/>
+        <p:cNvGrpSpPr/>
+        <p:nvPr/>
+      </p:nvGrpSpPr>
+      <p:grpSpPr>
+        <a:xfrm>
+          <a:off x="0" y="0"/>
+          <a:ext cx="0" cy="0"/>
+          <a:chOff x="0" y="0"/>
+          <a:chExt cx="0" cy="0"/>
+        </a:xfrm>
+      </p:grpSpPr>
+      <p:sp>
+        <p:nvSpPr>
+          <p:cNvPr id="2" name="Title 1">
+            <a:extLst>
+              <a:ext uri="{FF2B5EF4-FFF2-40B4-BE49-F238E27FC236}">
                 <a16:creationId xmlns:a16="http://schemas.microsoft.com/office/drawing/2014/main" id="{ACF25869-DD43-428D-99B2-0A0292DAD8E5}"/>
               </a:ext>
             </a:extLst>
@@ -3878,7 +4003,7 @@
 </p:sld>
 </file>
 
-<file path=ppt/slides/slide6.xml><?xml version="1.0" encoding="utf-8"?>
+<file path=ppt/slides/slide7.xml><?xml version="1.0" encoding="utf-8"?>
 <p:sld xmlns:a="http://schemas.openxmlformats.org/drawingml/2006/main" xmlns:r="http://schemas.openxmlformats.org/officeDocument/2006/relationships" xmlns:p="http://schemas.openxmlformats.org/presentationml/2006/main">
   <p:cSld>
     <p:spTree>
@@ -3926,10 +4051,10 @@
       </p:sp>
       <p:pic>
         <p:nvPicPr>
-          <p:cNvPr id="4" name="Content Placeholder 3">
-            <a:extLst>
-              <a:ext uri="{FF2B5EF4-FFF2-40B4-BE49-F238E27FC236}">
-                <a16:creationId xmlns:a16="http://schemas.microsoft.com/office/drawing/2014/main" id="{0449F801-9311-4E37-8DDC-21667E64155F}"/>
+          <p:cNvPr id="6" name="Content Placeholder 5">
+            <a:extLst>
+              <a:ext uri="{FF2B5EF4-FFF2-40B4-BE49-F238E27FC236}">
+                <a16:creationId xmlns:a16="http://schemas.microsoft.com/office/drawing/2014/main" id="{4464C1AE-8FAE-4AE5-8132-2831634B6178}"/>
               </a:ext>
             </a:extLst>
           </p:cNvPr>
@@ -3940,15 +4065,16 @@
             <p:ph idx="1"/>
           </p:nvPr>
         </p:nvPicPr>
-        <p:blipFill rotWithShape="1">
+        <p:blipFill>
           <a:blip r:embed="rId2"/>
-          <a:srcRect l="8136" t="17586" r="65514" b="16964"/>
-          <a:stretch/>
+          <a:stretch>
+            <a:fillRect/>
+          </a:stretch>
         </p:blipFill>
         <p:spPr>
           <a:xfrm>
-            <a:off x="4248150" y="2005012"/>
-            <a:ext cx="3257550" cy="4551438"/>
+            <a:off x="2228144" y="1825625"/>
+            <a:ext cx="7735712" cy="4351338"/>
           </a:xfrm>
           <a:prstGeom prst="rect">
             <a:avLst/>

</xml_diff>